<commit_message>
additional testing and extra model draws
</commit_message>
<xml_diff>
--- a/docs/TC meeting 6-20-25 Lou.pptx
+++ b/docs/TC meeting 6-20-25 Lou.pptx
@@ -242,7 +242,7 @@
           <a:p>
             <a:fld id="{A11A20AB-E5CF-4A74-AC79-99F5DA5AF5D6}" type="datetimeFigureOut">
               <a:rPr lang="en-US" smtClean="0"/>
-              <a:t>6/18/2025</a:t>
+              <a:t>11/18/2025</a:t>
             </a:fld>
             <a:endParaRPr lang="en-US"/>
           </a:p>
@@ -7384,11 +7384,11 @@
   <p:clrMapOvr>
     <a:masterClrMapping/>
   </p:clrMapOvr>
-  <mc:AlternateContent xmlns:mc="http://schemas.openxmlformats.org/markup-compatibility/2006">
-    <mc:Choice xmlns:p14="http://schemas.microsoft.com/office/powerpoint/2010/main" Requires="p14">
+  <mc:AlternateContent xmlns:mc="http://schemas.openxmlformats.org/markup-compatibility/2006" xmlns:p14="http://schemas.microsoft.com/office/powerpoint/2010/main">
+    <mc:Choice Requires="p14">
       <p:transition p14:dur="10" advClick="0"/>
     </mc:Choice>
-    <mc:Fallback>
+    <mc:Fallback xmlns="">
       <p:transition advClick="0"/>
     </mc:Fallback>
   </mc:AlternateContent>
@@ -7903,11 +7903,11 @@
   <p:clrMapOvr>
     <a:masterClrMapping/>
   </p:clrMapOvr>
-  <mc:AlternateContent xmlns:mc="http://schemas.openxmlformats.org/markup-compatibility/2006">
-    <mc:Choice xmlns:p14="http://schemas.microsoft.com/office/powerpoint/2010/main" Requires="p14">
+  <mc:AlternateContent xmlns:mc="http://schemas.openxmlformats.org/markup-compatibility/2006" xmlns:p14="http://schemas.microsoft.com/office/powerpoint/2010/main">
+    <mc:Choice Requires="p14">
       <p:transition p14:dur="10" advClick="0"/>
     </mc:Choice>
-    <mc:Fallback>
+    <mc:Fallback xmlns="">
       <p:transition advClick="0"/>
     </mc:Fallback>
   </mc:AlternateContent>
@@ -12915,8 +12915,8 @@
           </a:p>
         </p:txBody>
       </p:sp>
-      <mc:AlternateContent xmlns:mc="http://schemas.openxmlformats.org/markup-compatibility/2006">
-        <mc:Choice xmlns:a14="http://schemas.microsoft.com/office/drawing/2010/main" Requires="a14">
+      <mc:AlternateContent xmlns:mc="http://schemas.openxmlformats.org/markup-compatibility/2006" xmlns:a14="http://schemas.microsoft.com/office/drawing/2010/main">
+        <mc:Choice Requires="a14">
           <p:sp>
             <p:nvSpPr>
               <p:cNvPr id="5" name="Text Placeholder 4">
@@ -13625,7 +13625,7 @@
             </p:txBody>
           </p:sp>
         </mc:Choice>
-        <mc:Fallback>
+        <mc:Fallback xmlns="">
           <p:sp>
             <p:nvSpPr>
               <p:cNvPr id="5" name="Text Placeholder 4">
@@ -14396,11 +14396,11 @@
   <p:clrMapOvr>
     <a:masterClrMapping/>
   </p:clrMapOvr>
-  <mc:AlternateContent xmlns:mc="http://schemas.openxmlformats.org/markup-compatibility/2006">
-    <mc:Choice xmlns:p14="http://schemas.microsoft.com/office/powerpoint/2010/main" Requires="p14">
+  <mc:AlternateContent xmlns:mc="http://schemas.openxmlformats.org/markup-compatibility/2006" xmlns:p14="http://schemas.microsoft.com/office/powerpoint/2010/main">
+    <mc:Choice Requires="p14">
       <p:transition p14:dur="10" advClick="0"/>
     </mc:Choice>
-    <mc:Fallback>
+    <mc:Fallback xmlns="">
       <p:transition advClick="0"/>
     </mc:Fallback>
   </mc:AlternateContent>
@@ -15605,11 +15605,11 @@
   <p:clrMapOvr>
     <a:masterClrMapping/>
   </p:clrMapOvr>
-  <mc:AlternateContent xmlns:mc="http://schemas.openxmlformats.org/markup-compatibility/2006">
-    <mc:Choice xmlns:p14="http://schemas.microsoft.com/office/powerpoint/2010/main" Requires="p14">
+  <mc:AlternateContent xmlns:mc="http://schemas.openxmlformats.org/markup-compatibility/2006" xmlns:p14="http://schemas.microsoft.com/office/powerpoint/2010/main">
+    <mc:Choice Requires="p14">
       <p:transition p14:dur="10" advClick="0"/>
     </mc:Choice>
-    <mc:Fallback>
+    <mc:Fallback xmlns="">
       <p:transition advClick="0"/>
     </mc:Fallback>
   </mc:AlternateContent>
@@ -15718,11 +15718,11 @@
   <p:clrMapOvr>
     <a:masterClrMapping/>
   </p:clrMapOvr>
-  <mc:AlternateContent xmlns:mc="http://schemas.openxmlformats.org/markup-compatibility/2006">
-    <mc:Choice xmlns:p14="http://schemas.microsoft.com/office/powerpoint/2010/main" Requires="p14">
+  <mc:AlternateContent xmlns:mc="http://schemas.openxmlformats.org/markup-compatibility/2006" xmlns:p14="http://schemas.microsoft.com/office/powerpoint/2010/main">
+    <mc:Choice Requires="p14">
       <p:transition p14:dur="10" advClick="0"/>
     </mc:Choice>
-    <mc:Fallback>
+    <mc:Fallback xmlns="">
       <p:transition advClick="0"/>
     </mc:Fallback>
   </mc:AlternateContent>
@@ -16742,11 +16742,11 @@
   <p:clrMapOvr>
     <a:masterClrMapping/>
   </p:clrMapOvr>
-  <mc:AlternateContent xmlns:mc="http://schemas.openxmlformats.org/markup-compatibility/2006">
-    <mc:Choice xmlns:p14="http://schemas.microsoft.com/office/powerpoint/2010/main" Requires="p14">
+  <mc:AlternateContent xmlns:mc="http://schemas.openxmlformats.org/markup-compatibility/2006" xmlns:p14="http://schemas.microsoft.com/office/powerpoint/2010/main">
+    <mc:Choice Requires="p14">
       <p:transition p14:dur="10" advClick="0"/>
     </mc:Choice>
-    <mc:Fallback>
+    <mc:Fallback xmlns="">
       <p:transition advClick="0"/>
     </mc:Fallback>
   </mc:AlternateContent>
@@ -17924,11 +17924,11 @@
   <p:clrMapOvr>
     <a:masterClrMapping/>
   </p:clrMapOvr>
-  <mc:AlternateContent xmlns:mc="http://schemas.openxmlformats.org/markup-compatibility/2006">
-    <mc:Choice xmlns:p14="http://schemas.microsoft.com/office/powerpoint/2010/main" Requires="p14">
+  <mc:AlternateContent xmlns:mc="http://schemas.openxmlformats.org/markup-compatibility/2006" xmlns:p14="http://schemas.microsoft.com/office/powerpoint/2010/main">
+    <mc:Choice Requires="p14">
       <p:transition p14:dur="10" advClick="0"/>
     </mc:Choice>
-    <mc:Fallback>
+    <mc:Fallback xmlns="">
       <p:transition advClick="0"/>
     </mc:Fallback>
   </mc:AlternateContent>
@@ -18066,11 +18066,11 @@
   <p:clrMapOvr>
     <a:masterClrMapping/>
   </p:clrMapOvr>
-  <mc:AlternateContent xmlns:mc="http://schemas.openxmlformats.org/markup-compatibility/2006">
-    <mc:Choice xmlns:p14="http://schemas.microsoft.com/office/powerpoint/2010/main" Requires="p14">
+  <mc:AlternateContent xmlns:mc="http://schemas.openxmlformats.org/markup-compatibility/2006" xmlns:p14="http://schemas.microsoft.com/office/powerpoint/2010/main">
+    <mc:Choice Requires="p14">
       <p:transition p14:dur="10" advClick="0"/>
     </mc:Choice>
-    <mc:Fallback>
+    <mc:Fallback xmlns="">
       <p:transition advClick="0"/>
     </mc:Fallback>
   </mc:AlternateContent>
@@ -18208,11 +18208,11 @@
   <p:clrMapOvr>
     <a:masterClrMapping/>
   </p:clrMapOvr>
-  <mc:AlternateContent xmlns:mc="http://schemas.openxmlformats.org/markup-compatibility/2006">
-    <mc:Choice xmlns:p14="http://schemas.microsoft.com/office/powerpoint/2010/main" Requires="p14">
+  <mc:AlternateContent xmlns:mc="http://schemas.openxmlformats.org/markup-compatibility/2006" xmlns:p14="http://schemas.microsoft.com/office/powerpoint/2010/main">
+    <mc:Choice Requires="p14">
       <p:transition p14:dur="10" advClick="0"/>
     </mc:Choice>
-    <mc:Fallback>
+    <mc:Fallback xmlns="">
       <p:transition advClick="0"/>
     </mc:Fallback>
   </mc:AlternateContent>
@@ -18333,11 +18333,11 @@
   <p:clrMapOvr>
     <a:masterClrMapping/>
   </p:clrMapOvr>
-  <mc:AlternateContent xmlns:mc="http://schemas.openxmlformats.org/markup-compatibility/2006">
-    <mc:Choice xmlns:p14="http://schemas.microsoft.com/office/powerpoint/2010/main" Requires="p14">
+  <mc:AlternateContent xmlns:mc="http://schemas.openxmlformats.org/markup-compatibility/2006" xmlns:p14="http://schemas.microsoft.com/office/powerpoint/2010/main">
+    <mc:Choice Requires="p14">
       <p:transition p14:dur="10" advClick="0"/>
     </mc:Choice>
-    <mc:Fallback>
+    <mc:Fallback xmlns="">
       <p:transition advClick="0"/>
     </mc:Fallback>
   </mc:AlternateContent>
@@ -19495,11 +19495,11 @@
   <p:clrMapOvr>
     <a:masterClrMapping/>
   </p:clrMapOvr>
-  <mc:AlternateContent xmlns:mc="http://schemas.openxmlformats.org/markup-compatibility/2006">
-    <mc:Choice xmlns:p14="http://schemas.microsoft.com/office/powerpoint/2010/main" Requires="p14">
+  <mc:AlternateContent xmlns:mc="http://schemas.openxmlformats.org/markup-compatibility/2006" xmlns:p14="http://schemas.microsoft.com/office/powerpoint/2010/main">
+    <mc:Choice Requires="p14">
       <p:transition p14:dur="10" advClick="0"/>
     </mc:Choice>
-    <mc:Fallback>
+    <mc:Fallback xmlns="">
       <p:transition advClick="0"/>
     </mc:Fallback>
   </mc:AlternateContent>
@@ -21816,7 +21816,7 @@
           <p:nvPr>
             <p:extLst>
               <p:ext uri="{D42A27DB-BD31-4B8C-83A1-F6EECF244321}">
-                <p14:modId xmlns:p14="http://schemas.microsoft.com/office/powerpoint/2010/main" val="33188838"/>
+                <p14:modId xmlns:p14="http://schemas.microsoft.com/office/powerpoint/2010/main" val="1007649910"/>
               </p:ext>
             </p:extLst>
           </p:nvPr>
@@ -21997,7 +21997,7 @@
                     <a:p>
                       <a:pPr algn="ctr" fontAlgn="ctr"/>
                       <a:r>
-                        <a:rPr lang="en-US" sz="1600" b="0" i="0" u="none" strike="noStrike">
+                        <a:rPr lang="en-US" sz="1600" b="0" i="0" u="none" strike="noStrike" dirty="0">
                           <a:solidFill>
                             <a:srgbClr val="000000"/>
                           </a:solidFill>
@@ -22006,13 +22006,6 @@
                         </a:rPr>
                         <a:t>2024</a:t>
                       </a:r>
-                      <a:endParaRPr lang="en-US" sz="1600" b="0" i="0" u="none" strike="noStrike" dirty="0">
-                        <a:solidFill>
-                          <a:srgbClr val="000000"/>
-                        </a:solidFill>
-                        <a:effectLst/>
-                        <a:latin typeface="Arial Narrow" panose="020B0606020202030204" pitchFamily="34" charset="0"/>
-                      </a:endParaRPr>
                     </a:p>
                   </a:txBody>
                   <a:tcPr marL="7294" marR="7294" marT="7294" marB="0" anchor="ctr">
@@ -22268,72 +22261,8 @@
                           <a:effectLst/>
                           <a:latin typeface="Arial Narrow" panose="020B0606020202030204" pitchFamily="34" charset="0"/>
                         </a:rPr>
-                        <a:t>6</a:t>
+                        <a:t>5/6</a:t>
                       </a:r>
-                    </a:p>
-                  </a:txBody>
-                  <a:tcPr marL="7294" marR="7294" marT="7294" marB="0" anchor="ctr">
-                    <a:lnL w="12700" cap="flat" cmpd="sng" algn="ctr">
-                      <a:solidFill>
-                        <a:schemeClr val="tx1"/>
-                      </a:solidFill>
-                      <a:prstDash val="solid"/>
-                      <a:round/>
-                      <a:headEnd type="none" w="med" len="med"/>
-                      <a:tailEnd type="none" w="med" len="med"/>
-                    </a:lnL>
-                    <a:lnR w="12700" cap="flat" cmpd="sng" algn="ctr">
-                      <a:solidFill>
-                        <a:schemeClr val="tx1"/>
-                      </a:solidFill>
-                      <a:prstDash val="solid"/>
-                      <a:round/>
-                      <a:headEnd type="none" w="med" len="med"/>
-                      <a:tailEnd type="none" w="med" len="med"/>
-                    </a:lnR>
-                    <a:lnT w="12700" cap="flat" cmpd="sng" algn="ctr">
-                      <a:solidFill>
-                        <a:schemeClr val="tx1"/>
-                      </a:solidFill>
-                      <a:prstDash val="solid"/>
-                      <a:round/>
-                      <a:headEnd type="none" w="med" len="med"/>
-                      <a:tailEnd type="none" w="med" len="med"/>
-                    </a:lnT>
-                    <a:lnB w="12700" cap="flat" cmpd="sng" algn="ctr">
-                      <a:solidFill>
-                        <a:schemeClr val="tx1"/>
-                      </a:solidFill>
-                      <a:prstDash val="solid"/>
-                      <a:round/>
-                      <a:headEnd type="none" w="med" len="med"/>
-                      <a:tailEnd type="none" w="med" len="med"/>
-                    </a:lnB>
-                  </a:tcPr>
-                </a:tc>
-                <a:tc>
-                  <a:txBody>
-                    <a:bodyPr/>
-                    <a:lstStyle/>
-                    <a:p>
-                      <a:pPr algn="ctr" fontAlgn="ctr"/>
-                      <a:r>
-                        <a:rPr lang="en-US" sz="1600" b="0" i="0" u="none" strike="noStrike">
-                          <a:solidFill>
-                            <a:srgbClr val="000000"/>
-                          </a:solidFill>
-                          <a:effectLst/>
-                          <a:latin typeface="Arial Narrow" panose="020B0606020202030204" pitchFamily="34" charset="0"/>
-                        </a:rPr>
-                        <a:t>1 through 6</a:t>
-                      </a:r>
-                      <a:endParaRPr lang="en-US" sz="1600" b="0" i="0" u="none" strike="noStrike" dirty="0">
-                        <a:solidFill>
-                          <a:srgbClr val="000000"/>
-                        </a:solidFill>
-                        <a:effectLst/>
-                        <a:latin typeface="Arial Narrow" panose="020B0606020202030204" pitchFamily="34" charset="0"/>
-                      </a:endParaRPr>
                     </a:p>
                   </a:txBody>
                   <a:tcPr marL="7294" marR="7294" marT="7294" marB="0" anchor="ctr">
@@ -22389,7 +22318,7 @@
                           <a:effectLst/>
                           <a:latin typeface="Arial Narrow" panose="020B0606020202030204" pitchFamily="34" charset="0"/>
                         </a:rPr>
-                        <a:t>1 through 5</a:t>
+                        <a:t>1 through 6</a:t>
                       </a:r>
                     </a:p>
                   </a:txBody>
@@ -22446,7 +22375,64 @@
                           <a:effectLst/>
                           <a:latin typeface="Arial Narrow" panose="020B0606020202030204" pitchFamily="34" charset="0"/>
                         </a:rPr>
-                        <a:t>6</a:t>
+                        <a:t>1 through 4</a:t>
+                      </a:r>
+                    </a:p>
+                  </a:txBody>
+                  <a:tcPr marL="7294" marR="7294" marT="7294" marB="0" anchor="ctr">
+                    <a:lnL w="12700" cap="flat" cmpd="sng" algn="ctr">
+                      <a:solidFill>
+                        <a:schemeClr val="tx1"/>
+                      </a:solidFill>
+                      <a:prstDash val="solid"/>
+                      <a:round/>
+                      <a:headEnd type="none" w="med" len="med"/>
+                      <a:tailEnd type="none" w="med" len="med"/>
+                    </a:lnL>
+                    <a:lnR w="12700" cap="flat" cmpd="sng" algn="ctr">
+                      <a:solidFill>
+                        <a:schemeClr val="tx1"/>
+                      </a:solidFill>
+                      <a:prstDash val="solid"/>
+                      <a:round/>
+                      <a:headEnd type="none" w="med" len="med"/>
+                      <a:tailEnd type="none" w="med" len="med"/>
+                    </a:lnR>
+                    <a:lnT w="12700" cap="flat" cmpd="sng" algn="ctr">
+                      <a:solidFill>
+                        <a:schemeClr val="tx1"/>
+                      </a:solidFill>
+                      <a:prstDash val="solid"/>
+                      <a:round/>
+                      <a:headEnd type="none" w="med" len="med"/>
+                      <a:tailEnd type="none" w="med" len="med"/>
+                    </a:lnT>
+                    <a:lnB w="12700" cap="flat" cmpd="sng" algn="ctr">
+                      <a:solidFill>
+                        <a:schemeClr val="tx1"/>
+                      </a:solidFill>
+                      <a:prstDash val="solid"/>
+                      <a:round/>
+                      <a:headEnd type="none" w="med" len="med"/>
+                      <a:tailEnd type="none" w="med" len="med"/>
+                    </a:lnB>
+                  </a:tcPr>
+                </a:tc>
+                <a:tc>
+                  <a:txBody>
+                    <a:bodyPr/>
+                    <a:lstStyle/>
+                    <a:p>
+                      <a:pPr algn="ctr" fontAlgn="ctr"/>
+                      <a:r>
+                        <a:rPr lang="en-US" sz="1600" b="0" i="0" u="none" strike="noStrike" dirty="0">
+                          <a:solidFill>
+                            <a:srgbClr val="000000"/>
+                          </a:solidFill>
+                          <a:effectLst/>
+                          <a:latin typeface="Arial Narrow" panose="020B0606020202030204" pitchFamily="34" charset="0"/>
+                        </a:rPr>
+                        <a:t>5/6</a:t>
                       </a:r>
                     </a:p>
                   </a:txBody>
@@ -23395,6 +23381,15 @@
                     </a:p>
                   </a:txBody>
                   <a:tcPr marL="7294" marR="7294" marT="7294" marB="0" anchor="ctr">
+                    <a:lnL w="12700" cap="flat" cmpd="sng" algn="ctr">
+                      <a:solidFill>
+                        <a:schemeClr val="tx1"/>
+                      </a:solidFill>
+                      <a:prstDash val="solid"/>
+                      <a:round/>
+                      <a:headEnd type="none" w="med" len="med"/>
+                      <a:tailEnd type="none" w="med" len="med"/>
+                    </a:lnL>
                     <a:lnR>
                       <a:noFill/>
                     </a:lnR>

</xml_diff>